<commit_message>
- finished the code stuff and the presentation
Signed-off-by: Konstantin Preusser <konstantin.preusser@gmx.de>
</commit_message>
<xml_diff>
--- a/presentation/ChessEngines.pptx
+++ b/presentation/ChessEngines.pptx
@@ -13,22 +13,24 @@
     <p:sldId id="263" r:id="rId7"/>
     <p:sldId id="269" r:id="rId8"/>
     <p:sldId id="266" r:id="rId9"/>
-    <p:sldId id="271" r:id="rId10"/>
-    <p:sldId id="272" r:id="rId11"/>
-    <p:sldId id="273" r:id="rId12"/>
-    <p:sldId id="275" r:id="rId13"/>
-    <p:sldId id="278" r:id="rId14"/>
-    <p:sldId id="274" r:id="rId15"/>
-    <p:sldId id="276" r:id="rId16"/>
-    <p:sldId id="277" r:id="rId17"/>
-    <p:sldId id="279" r:id="rId18"/>
-    <p:sldId id="280" r:id="rId19"/>
-    <p:sldId id="267" r:id="rId20"/>
-    <p:sldId id="281" r:id="rId21"/>
-    <p:sldId id="268" r:id="rId22"/>
-    <p:sldId id="261" r:id="rId23"/>
-    <p:sldId id="270" r:id="rId24"/>
-    <p:sldId id="259" r:id="rId25"/>
+    <p:sldId id="282" r:id="rId10"/>
+    <p:sldId id="271" r:id="rId11"/>
+    <p:sldId id="272" r:id="rId12"/>
+    <p:sldId id="273" r:id="rId13"/>
+    <p:sldId id="275" r:id="rId14"/>
+    <p:sldId id="278" r:id="rId15"/>
+    <p:sldId id="274" r:id="rId16"/>
+    <p:sldId id="276" r:id="rId17"/>
+    <p:sldId id="277" r:id="rId18"/>
+    <p:sldId id="279" r:id="rId19"/>
+    <p:sldId id="280" r:id="rId20"/>
+    <p:sldId id="267" r:id="rId21"/>
+    <p:sldId id="281" r:id="rId22"/>
+    <p:sldId id="268" r:id="rId23"/>
+    <p:sldId id="283" r:id="rId24"/>
+    <p:sldId id="261" r:id="rId25"/>
+    <p:sldId id="270" r:id="rId26"/>
+    <p:sldId id="259" r:id="rId27"/>
   </p:sldIdLst>
   <p:sldSz cx="12192000" cy="6858000"/>
   <p:notesSz cx="6858000" cy="9144000"/>
@@ -3682,7 +3684,7 @@
           <a:p>
             <a:fld id="{B4D64E45-7013-4C70-8B8F-CB491A4D6D20}" type="datetimeFigureOut">
               <a:rPr lang="es-ES" smtClean="0"/>
-              <a:t>10/12/2024</a:t>
+              <a:t>11/12/2024</a:t>
             </a:fld>
             <a:endParaRPr lang="es-ES"/>
           </a:p>
@@ -4016,7 +4018,7 @@
           <a:p>
             <a:fld id="{B4D64E45-7013-4C70-8B8F-CB491A4D6D20}" type="datetimeFigureOut">
               <a:rPr lang="es-ES" smtClean="0"/>
-              <a:t>10/12/2024</a:t>
+              <a:t>11/12/2024</a:t>
             </a:fld>
             <a:endParaRPr lang="es-ES"/>
           </a:p>
@@ -4294,7 +4296,7 @@
           <a:p>
             <a:fld id="{B4D64E45-7013-4C70-8B8F-CB491A4D6D20}" type="datetimeFigureOut">
               <a:rPr lang="es-ES" smtClean="0"/>
-              <a:t>10/12/2024</a:t>
+              <a:t>11/12/2024</a:t>
             </a:fld>
             <a:endParaRPr lang="es-ES"/>
           </a:p>
@@ -4862,7 +4864,7 @@
           <a:p>
             <a:fld id="{B4D64E45-7013-4C70-8B8F-CB491A4D6D20}" type="datetimeFigureOut">
               <a:rPr lang="es-ES" smtClean="0"/>
-              <a:t>10/12/2024</a:t>
+              <a:t>11/12/2024</a:t>
             </a:fld>
             <a:endParaRPr lang="es-ES"/>
           </a:p>
@@ -5140,7 +5142,7 @@
           <a:p>
             <a:fld id="{B4D64E45-7013-4C70-8B8F-CB491A4D6D20}" type="datetimeFigureOut">
               <a:rPr lang="es-ES" smtClean="0"/>
-              <a:t>10/12/2024</a:t>
+              <a:t>11/12/2024</a:t>
             </a:fld>
             <a:endParaRPr lang="es-ES"/>
           </a:p>
@@ -5702,7 +5704,7 @@
           <a:p>
             <a:fld id="{B4D64E45-7013-4C70-8B8F-CB491A4D6D20}" type="datetimeFigureOut">
               <a:rPr lang="es-ES" smtClean="0"/>
-              <a:t>10/12/2024</a:t>
+              <a:t>11/12/2024</a:t>
             </a:fld>
             <a:endParaRPr lang="es-ES"/>
           </a:p>
@@ -6029,7 +6031,7 @@
           <a:p>
             <a:fld id="{B4D64E45-7013-4C70-8B8F-CB491A4D6D20}" type="datetimeFigureOut">
               <a:rPr lang="es-ES" smtClean="0"/>
-              <a:t>10/12/2024</a:t>
+              <a:t>11/12/2024</a:t>
             </a:fld>
             <a:endParaRPr lang="es-ES"/>
           </a:p>
@@ -6206,7 +6208,7 @@
           <a:p>
             <a:fld id="{B4D64E45-7013-4C70-8B8F-CB491A4D6D20}" type="datetimeFigureOut">
               <a:rPr lang="es-ES" smtClean="0"/>
-              <a:t>10/12/2024</a:t>
+              <a:t>11/12/2024</a:t>
             </a:fld>
             <a:endParaRPr lang="es-ES"/>
           </a:p>
@@ -6444,7 +6446,7 @@
           <a:p>
             <a:fld id="{B4D64E45-7013-4C70-8B8F-CB491A4D6D20}" type="datetimeFigureOut">
               <a:rPr lang="es-ES" smtClean="0"/>
-              <a:t>10/12/2024</a:t>
+              <a:t>11/12/2024</a:t>
             </a:fld>
             <a:endParaRPr lang="es-ES"/>
           </a:p>
@@ -6644,7 +6646,7 @@
           <a:p>
             <a:fld id="{B4D64E45-7013-4C70-8B8F-CB491A4D6D20}" type="datetimeFigureOut">
               <a:rPr lang="es-ES" smtClean="0"/>
-              <a:t>10/12/2024</a:t>
+              <a:t>11/12/2024</a:t>
             </a:fld>
             <a:endParaRPr lang="es-ES"/>
           </a:p>
@@ -6920,7 +6922,7 @@
           <a:p>
             <a:fld id="{B4D64E45-7013-4C70-8B8F-CB491A4D6D20}" type="datetimeFigureOut">
               <a:rPr lang="es-ES" smtClean="0"/>
-              <a:t>10/12/2024</a:t>
+              <a:t>11/12/2024</a:t>
             </a:fld>
             <a:endParaRPr lang="es-ES"/>
           </a:p>
@@ -7186,7 +7188,7 @@
           <a:p>
             <a:fld id="{B4D64E45-7013-4C70-8B8F-CB491A4D6D20}" type="datetimeFigureOut">
               <a:rPr lang="es-ES" smtClean="0"/>
-              <a:t>10/12/2024</a:t>
+              <a:t>11/12/2024</a:t>
             </a:fld>
             <a:endParaRPr lang="es-ES"/>
           </a:p>
@@ -7560,7 +7562,7 @@
           <a:p>
             <a:fld id="{B4D64E45-7013-4C70-8B8F-CB491A4D6D20}" type="datetimeFigureOut">
               <a:rPr lang="es-ES" smtClean="0"/>
-              <a:t>10/12/2024</a:t>
+              <a:t>11/12/2024</a:t>
             </a:fld>
             <a:endParaRPr lang="es-ES"/>
           </a:p>
@@ -7708,7 +7710,7 @@
           <a:p>
             <a:fld id="{B4D64E45-7013-4C70-8B8F-CB491A4D6D20}" type="datetimeFigureOut">
               <a:rPr lang="es-ES" smtClean="0"/>
-              <a:t>10/12/2024</a:t>
+              <a:t>11/12/2024</a:t>
             </a:fld>
             <a:endParaRPr lang="es-ES"/>
           </a:p>
@@ -7833,7 +7835,7 @@
           <a:p>
             <a:fld id="{B4D64E45-7013-4C70-8B8F-CB491A4D6D20}" type="datetimeFigureOut">
               <a:rPr lang="es-ES" smtClean="0"/>
-              <a:t>10/12/2024</a:t>
+              <a:t>11/12/2024</a:t>
             </a:fld>
             <a:endParaRPr lang="es-ES"/>
           </a:p>
@@ -8118,7 +8120,7 @@
           <a:p>
             <a:fld id="{B4D64E45-7013-4C70-8B8F-CB491A4D6D20}" type="datetimeFigureOut">
               <a:rPr lang="es-ES" smtClean="0"/>
-              <a:t>10/12/2024</a:t>
+              <a:t>11/12/2024</a:t>
             </a:fld>
             <a:endParaRPr lang="es-ES"/>
           </a:p>
@@ -8442,7 +8444,7 @@
           <a:p>
             <a:fld id="{B4D64E45-7013-4C70-8B8F-CB491A4D6D20}" type="datetimeFigureOut">
               <a:rPr lang="es-ES" smtClean="0"/>
-              <a:t>10/12/2024</a:t>
+              <a:t>11/12/2024</a:t>
             </a:fld>
             <a:endParaRPr lang="es-ES"/>
           </a:p>
@@ -8656,7 +8658,7 @@
           <a:p>
             <a:fld id="{B4D64E45-7013-4C70-8B8F-CB491A4D6D20}" type="datetimeFigureOut">
               <a:rPr lang="es-ES" smtClean="0"/>
-              <a:t>10/12/2024</a:t>
+              <a:t>11/12/2024</a:t>
             </a:fld>
             <a:endParaRPr lang="es-ES"/>
           </a:p>
@@ -11624,6 +11626,197 @@
   <p:cSld>
     <p:spTree>
       <p:nvGrpSpPr>
+        <p:cNvPr id="1" name=""/>
+        <p:cNvGrpSpPr/>
+        <p:nvPr/>
+      </p:nvGrpSpPr>
+      <p:grpSpPr>
+        <a:xfrm>
+          <a:off x="0" y="0"/>
+          <a:ext cx="0" cy="0"/>
+          <a:chOff x="0" y="0"/>
+          <a:chExt cx="0" cy="0"/>
+        </a:xfrm>
+      </p:grpSpPr>
+      <p:sp>
+        <p:nvSpPr>
+          <p:cNvPr id="2" name="Titel 1">
+            <a:extLst>
+              <a:ext uri="{FF2B5EF4-FFF2-40B4-BE49-F238E27FC236}">
+                <a16:creationId xmlns:a16="http://schemas.microsoft.com/office/drawing/2014/main" id="{6C3BD070-EBEF-7F89-0C82-9576F1191F75}"/>
+              </a:ext>
+            </a:extLst>
+          </p:cNvPr>
+          <p:cNvSpPr>
+            <a:spLocks noGrp="1"/>
+          </p:cNvSpPr>
+          <p:nvPr>
+            <p:ph type="title"/>
+          </p:nvPr>
+        </p:nvSpPr>
+        <p:spPr/>
+        <p:txBody>
+          <a:bodyPr/>
+          <a:lstStyle/>
+          <a:p>
+            <a:r>
+              <a:rPr lang="de-DE" dirty="0"/>
+              <a:t>Alpha Zero - MCTS </a:t>
+            </a:r>
+            <a:endParaRPr lang="es-ES" dirty="0"/>
+          </a:p>
+        </p:txBody>
+      </p:sp>
+      <p:sp>
+        <p:nvSpPr>
+          <p:cNvPr id="4" name="Ellipse 3">
+            <a:extLst>
+              <a:ext uri="{FF2B5EF4-FFF2-40B4-BE49-F238E27FC236}">
+                <a16:creationId xmlns:a16="http://schemas.microsoft.com/office/drawing/2014/main" id="{42B29592-5718-A431-E438-408F9FF89346}"/>
+              </a:ext>
+            </a:extLst>
+          </p:cNvPr>
+          <p:cNvSpPr/>
+          <p:nvPr/>
+        </p:nvSpPr>
+        <p:spPr>
+          <a:xfrm>
+            <a:off x="6872866" y="1899634"/>
+            <a:ext cx="716684" cy="594206"/>
+          </a:xfrm>
+          <a:prstGeom prst="ellipse">
+            <a:avLst/>
+          </a:prstGeom>
+        </p:spPr>
+        <p:style>
+          <a:lnRef idx="1">
+            <a:schemeClr val="dk1"/>
+          </a:lnRef>
+          <a:fillRef idx="2">
+            <a:schemeClr val="dk1"/>
+          </a:fillRef>
+          <a:effectRef idx="1">
+            <a:schemeClr val="dk1"/>
+          </a:effectRef>
+          <a:fontRef idx="minor">
+            <a:schemeClr val="dk1"/>
+          </a:fontRef>
+        </p:style>
+        <p:txBody>
+          <a:bodyPr rtlCol="0" anchor="ctr"/>
+          <a:lstStyle/>
+          <a:p>
+            <a:pPr algn="ctr"/>
+            <a:r>
+              <a:rPr lang="de-DE" dirty="0"/>
+              <a:t>S₀</a:t>
+            </a:r>
+            <a:endParaRPr lang="es-ES" dirty="0"/>
+          </a:p>
+        </p:txBody>
+      </p:sp>
+      <p:sp>
+        <p:nvSpPr>
+          <p:cNvPr id="38" name="Textfeld 37">
+            <a:extLst>
+              <a:ext uri="{FF2B5EF4-FFF2-40B4-BE49-F238E27FC236}">
+                <a16:creationId xmlns:a16="http://schemas.microsoft.com/office/drawing/2014/main" id="{160B50BF-E8FE-60F5-E2C1-753A44DC864B}"/>
+              </a:ext>
+            </a:extLst>
+          </p:cNvPr>
+          <p:cNvSpPr txBox="1"/>
+          <p:nvPr/>
+        </p:nvSpPr>
+        <p:spPr>
+          <a:xfrm>
+            <a:off x="6872866" y="1534982"/>
+            <a:ext cx="809877" cy="369332"/>
+          </a:xfrm>
+          <a:prstGeom prst="rect">
+            <a:avLst/>
+          </a:prstGeom>
+          <a:noFill/>
+        </p:spPr>
+        <p:txBody>
+          <a:bodyPr wrap="square" rtlCol="0">
+            <a:spAutoFit/>
+          </a:bodyPr>
+          <a:lstStyle/>
+          <a:p>
+            <a:r>
+              <a:rPr lang="de-DE" dirty="0"/>
+              <a:t>Root</a:t>
+            </a:r>
+            <a:endParaRPr lang="es-ES" dirty="0"/>
+          </a:p>
+        </p:txBody>
+      </p:sp>
+      <p:sp>
+        <p:nvSpPr>
+          <p:cNvPr id="39" name="Textfeld 38">
+            <a:extLst>
+              <a:ext uri="{FF2B5EF4-FFF2-40B4-BE49-F238E27FC236}">
+                <a16:creationId xmlns:a16="http://schemas.microsoft.com/office/drawing/2014/main" id="{75018DEE-287E-F1A0-5F00-B1694BC631AC}"/>
+              </a:ext>
+            </a:extLst>
+          </p:cNvPr>
+          <p:cNvSpPr txBox="1"/>
+          <p:nvPr/>
+        </p:nvSpPr>
+        <p:spPr>
+          <a:xfrm>
+            <a:off x="7682743" y="1644073"/>
+            <a:ext cx="1516675" cy="923330"/>
+          </a:xfrm>
+          <a:prstGeom prst="rect">
+            <a:avLst/>
+          </a:prstGeom>
+          <a:noFill/>
+        </p:spPr>
+        <p:txBody>
+          <a:bodyPr wrap="square" rtlCol="0">
+            <a:spAutoFit/>
+          </a:bodyPr>
+          <a:lstStyle/>
+          <a:p>
+            <a:r>
+              <a:rPr lang="de-DE" dirty="0"/>
+              <a:t>w₀ = 0</a:t>
+            </a:r>
+          </a:p>
+          <a:p>
+            <a:r>
+              <a:rPr lang="de-DE" dirty="0"/>
+              <a:t>n₀ = 0</a:t>
+            </a:r>
+          </a:p>
+          <a:p>
+            <a:r>
+              <a:rPr lang="de-DE" dirty="0"/>
+              <a:t>P₀ = /</a:t>
+            </a:r>
+            <a:endParaRPr lang="es-ES" dirty="0"/>
+          </a:p>
+        </p:txBody>
+      </p:sp>
+    </p:spTree>
+    <p:extLst>
+      <p:ext uri="{BB962C8B-B14F-4D97-AF65-F5344CB8AC3E}">
+        <p14:creationId xmlns:p14="http://schemas.microsoft.com/office/powerpoint/2010/main" val="1608700028"/>
+      </p:ext>
+    </p:extLst>
+  </p:cSld>
+  <p:clrMapOvr>
+    <a:masterClrMapping/>
+  </p:clrMapOvr>
+</p:sld>
+</file>
+
+<file path=ppt/slides/slide11.xml><?xml version="1.0" encoding="utf-8"?>
+<p:sld xmlns:a="http://schemas.openxmlformats.org/drawingml/2006/main" xmlns:r="http://schemas.openxmlformats.org/officeDocument/2006/relationships" xmlns:p="http://schemas.openxmlformats.org/presentationml/2006/main">
+  <p:cSld>
+    <p:spTree>
+      <p:nvGrpSpPr>
         <p:cNvPr id="1" name="">
           <a:extLst>
             <a:ext uri="{FF2B5EF4-FFF2-40B4-BE49-F238E27FC236}">
@@ -11998,7 +12191,7 @@
 </p:sld>
 </file>
 
-<file path=ppt/slides/slide11.xml><?xml version="1.0" encoding="utf-8"?>
+<file path=ppt/slides/slide12.xml><?xml version="1.0" encoding="utf-8"?>
 <p:sld xmlns:a="http://schemas.openxmlformats.org/drawingml/2006/main" xmlns:r="http://schemas.openxmlformats.org/officeDocument/2006/relationships" xmlns:p="http://schemas.openxmlformats.org/presentationml/2006/main">
   <p:cSld>
     <p:spTree>
@@ -12587,7 +12780,7 @@
 </p:sld>
 </file>
 
-<file path=ppt/slides/slide12.xml><?xml version="1.0" encoding="utf-8"?>
+<file path=ppt/slides/slide13.xml><?xml version="1.0" encoding="utf-8"?>
 <p:sld xmlns:a="http://schemas.openxmlformats.org/drawingml/2006/main" xmlns:r="http://schemas.openxmlformats.org/officeDocument/2006/relationships" xmlns:p="http://schemas.openxmlformats.org/presentationml/2006/main">
   <p:cSld>
     <p:spTree>
@@ -13176,7 +13369,7 @@
 </p:sld>
 </file>
 
-<file path=ppt/slides/slide13.xml><?xml version="1.0" encoding="utf-8"?>
+<file path=ppt/slides/slide14.xml><?xml version="1.0" encoding="utf-8"?>
 <p:sld xmlns:a="http://schemas.openxmlformats.org/drawingml/2006/main" xmlns:r="http://schemas.openxmlformats.org/officeDocument/2006/relationships" xmlns:p="http://schemas.openxmlformats.org/presentationml/2006/main">
   <p:cSld>
     <p:spTree>
@@ -13837,7 +14030,7 @@
 </p:sld>
 </file>
 
-<file path=ppt/slides/slide14.xml><?xml version="1.0" encoding="utf-8"?>
+<file path=ppt/slides/slide15.xml><?xml version="1.0" encoding="utf-8"?>
 <p:sld xmlns:a="http://schemas.openxmlformats.org/drawingml/2006/main" xmlns:r="http://schemas.openxmlformats.org/officeDocument/2006/relationships" xmlns:p="http://schemas.openxmlformats.org/presentationml/2006/main">
   <p:cSld>
     <p:spTree>
@@ -14632,7 +14825,7 @@
 </p:sld>
 </file>
 
-<file path=ppt/slides/slide15.xml><?xml version="1.0" encoding="utf-8"?>
+<file path=ppt/slides/slide16.xml><?xml version="1.0" encoding="utf-8"?>
 <p:sld xmlns:a="http://schemas.openxmlformats.org/drawingml/2006/main" xmlns:r="http://schemas.openxmlformats.org/officeDocument/2006/relationships" xmlns:p="http://schemas.openxmlformats.org/presentationml/2006/main">
   <p:cSld>
     <p:spTree>
@@ -15567,7 +15760,7 @@
 </p:sld>
 </file>
 
-<file path=ppt/slides/slide16.xml><?xml version="1.0" encoding="utf-8"?>
+<file path=ppt/slides/slide17.xml><?xml version="1.0" encoding="utf-8"?>
 <p:sld xmlns:a="http://schemas.openxmlformats.org/drawingml/2006/main" xmlns:r="http://schemas.openxmlformats.org/officeDocument/2006/relationships" xmlns:p="http://schemas.openxmlformats.org/presentationml/2006/main">
   <p:cSld>
     <p:spTree>
@@ -16502,7 +16695,7 @@
 </p:sld>
 </file>
 
-<file path=ppt/slides/slide17.xml><?xml version="1.0" encoding="utf-8"?>
+<file path=ppt/slides/slide18.xml><?xml version="1.0" encoding="utf-8"?>
 <p:sld xmlns:a="http://schemas.openxmlformats.org/drawingml/2006/main" xmlns:r="http://schemas.openxmlformats.org/officeDocument/2006/relationships" xmlns:p="http://schemas.openxmlformats.org/presentationml/2006/main">
   <p:cSld>
     <p:spTree>
@@ -17537,7 +17730,7 @@
 </p:sld>
 </file>
 
-<file path=ppt/slides/slide18.xml><?xml version="1.0" encoding="utf-8"?>
+<file path=ppt/slides/slide19.xml><?xml version="1.0" encoding="utf-8"?>
 <p:sld xmlns:a="http://schemas.openxmlformats.org/drawingml/2006/main" xmlns:r="http://schemas.openxmlformats.org/officeDocument/2006/relationships" xmlns:p="http://schemas.openxmlformats.org/presentationml/2006/main">
   <p:cSld>
     <p:spTree>
@@ -17644,138 +17837,6 @@
     <p:extLst>
       <p:ext uri="{BB962C8B-B14F-4D97-AF65-F5344CB8AC3E}">
         <p14:creationId xmlns:p14="http://schemas.microsoft.com/office/powerpoint/2010/main" val="3672116652"/>
-      </p:ext>
-    </p:extLst>
-  </p:cSld>
-  <p:clrMapOvr>
-    <a:masterClrMapping/>
-  </p:clrMapOvr>
-</p:sld>
-</file>
-
-<file path=ppt/slides/slide19.xml><?xml version="1.0" encoding="utf-8"?>
-<p:sld xmlns:a="http://schemas.openxmlformats.org/drawingml/2006/main" xmlns:r="http://schemas.openxmlformats.org/officeDocument/2006/relationships" xmlns:p="http://schemas.openxmlformats.org/presentationml/2006/main">
-  <p:cSld>
-    <p:spTree>
-      <p:nvGrpSpPr>
-        <p:cNvPr id="1" name="">
-          <a:extLst>
-            <a:ext uri="{FF2B5EF4-FFF2-40B4-BE49-F238E27FC236}">
-              <a16:creationId xmlns:a16="http://schemas.microsoft.com/office/drawing/2014/main" id="{A70D437F-8FA7-A5BF-2256-1A3ECADB2799}"/>
-            </a:ext>
-          </a:extLst>
-        </p:cNvPr>
-        <p:cNvGrpSpPr/>
-        <p:nvPr/>
-      </p:nvGrpSpPr>
-      <p:grpSpPr>
-        <a:xfrm>
-          <a:off x="0" y="0"/>
-          <a:ext cx="0" cy="0"/>
-          <a:chOff x="0" y="0"/>
-          <a:chExt cx="0" cy="0"/>
-        </a:xfrm>
-      </p:grpSpPr>
-      <p:sp>
-        <p:nvSpPr>
-          <p:cNvPr id="2" name="Titel 1">
-            <a:extLst>
-              <a:ext uri="{FF2B5EF4-FFF2-40B4-BE49-F238E27FC236}">
-                <a16:creationId xmlns:a16="http://schemas.microsoft.com/office/drawing/2014/main" id="{CEAD0A41-6708-E812-A365-CBF0701B43B8}"/>
-              </a:ext>
-            </a:extLst>
-          </p:cNvPr>
-          <p:cNvSpPr>
-            <a:spLocks noGrp="1"/>
-          </p:cNvSpPr>
-          <p:nvPr>
-            <p:ph type="title"/>
-          </p:nvPr>
-        </p:nvSpPr>
-        <p:spPr/>
-        <p:txBody>
-          <a:bodyPr/>
-          <a:lstStyle/>
-          <a:p>
-            <a:r>
-              <a:rPr lang="de-DE" dirty="0"/>
-              <a:t>Alpha Zero – </a:t>
-            </a:r>
-            <a:r>
-              <a:rPr lang="de-DE" dirty="0" err="1"/>
-              <a:t>Neural</a:t>
-            </a:r>
-            <a:r>
-              <a:rPr lang="de-DE" dirty="0"/>
-              <a:t> network</a:t>
-            </a:r>
-            <a:endParaRPr lang="es-ES" dirty="0"/>
-          </a:p>
-        </p:txBody>
-      </p:sp>
-      <p:pic>
-        <p:nvPicPr>
-          <p:cNvPr id="5" name="Grafik 4">
-            <a:extLst>
-              <a:ext uri="{FF2B5EF4-FFF2-40B4-BE49-F238E27FC236}">
-                <a16:creationId xmlns:a16="http://schemas.microsoft.com/office/drawing/2014/main" id="{6F2B3800-F5B3-4168-E255-DDE73356B887}"/>
-              </a:ext>
-            </a:extLst>
-          </p:cNvPr>
-          <p:cNvPicPr>
-            <a:picLocks noChangeAspect="1"/>
-          </p:cNvPicPr>
-          <p:nvPr/>
-        </p:nvPicPr>
-        <p:blipFill>
-          <a:blip r:embed="rId2"/>
-          <a:srcRect t="12934" r="2515" b="2377"/>
-          <a:stretch/>
-        </p:blipFill>
-        <p:spPr>
-          <a:xfrm>
-            <a:off x="1219198" y="2294375"/>
-            <a:ext cx="6521203" cy="2818375"/>
-          </a:xfrm>
-          <a:prstGeom prst="rect">
-            <a:avLst/>
-          </a:prstGeom>
-        </p:spPr>
-      </p:pic>
-      <p:pic>
-        <p:nvPicPr>
-          <p:cNvPr id="9" name="Grafik 8">
-            <a:extLst>
-              <a:ext uri="{FF2B5EF4-FFF2-40B4-BE49-F238E27FC236}">
-                <a16:creationId xmlns:a16="http://schemas.microsoft.com/office/drawing/2014/main" id="{F108CC12-1443-5C74-E8EE-90F0DA346379}"/>
-              </a:ext>
-            </a:extLst>
-          </p:cNvPr>
-          <p:cNvPicPr>
-            <a:picLocks noChangeAspect="1"/>
-          </p:cNvPicPr>
-          <p:nvPr/>
-        </p:nvPicPr>
-        <p:blipFill>
-          <a:blip r:embed="rId3"/>
-          <a:stretch>
-            <a:fillRect/>
-          </a:stretch>
-        </p:blipFill>
-        <p:spPr>
-          <a:xfrm>
-            <a:off x="8859690" y="2572866"/>
-            <a:ext cx="2524284" cy="2017068"/>
-          </a:xfrm>
-          <a:prstGeom prst="rect">
-            <a:avLst/>
-          </a:prstGeom>
-        </p:spPr>
-      </p:pic>
-    </p:spTree>
-    <p:extLst>
-      <p:ext uri="{BB962C8B-B14F-4D97-AF65-F5344CB8AC3E}">
-        <p14:creationId xmlns:p14="http://schemas.microsoft.com/office/powerpoint/2010/main" val="2808769559"/>
       </p:ext>
     </p:extLst>
   </p:cSld>
@@ -18135,6 +18196,138 @@
         <p:cNvPr id="1" name="">
           <a:extLst>
             <a:ext uri="{FF2B5EF4-FFF2-40B4-BE49-F238E27FC236}">
+              <a16:creationId xmlns:a16="http://schemas.microsoft.com/office/drawing/2014/main" id="{A70D437F-8FA7-A5BF-2256-1A3ECADB2799}"/>
+            </a:ext>
+          </a:extLst>
+        </p:cNvPr>
+        <p:cNvGrpSpPr/>
+        <p:nvPr/>
+      </p:nvGrpSpPr>
+      <p:grpSpPr>
+        <a:xfrm>
+          <a:off x="0" y="0"/>
+          <a:ext cx="0" cy="0"/>
+          <a:chOff x="0" y="0"/>
+          <a:chExt cx="0" cy="0"/>
+        </a:xfrm>
+      </p:grpSpPr>
+      <p:sp>
+        <p:nvSpPr>
+          <p:cNvPr id="2" name="Titel 1">
+            <a:extLst>
+              <a:ext uri="{FF2B5EF4-FFF2-40B4-BE49-F238E27FC236}">
+                <a16:creationId xmlns:a16="http://schemas.microsoft.com/office/drawing/2014/main" id="{CEAD0A41-6708-E812-A365-CBF0701B43B8}"/>
+              </a:ext>
+            </a:extLst>
+          </p:cNvPr>
+          <p:cNvSpPr>
+            <a:spLocks noGrp="1"/>
+          </p:cNvSpPr>
+          <p:nvPr>
+            <p:ph type="title"/>
+          </p:nvPr>
+        </p:nvSpPr>
+        <p:spPr/>
+        <p:txBody>
+          <a:bodyPr/>
+          <a:lstStyle/>
+          <a:p>
+            <a:r>
+              <a:rPr lang="de-DE" dirty="0"/>
+              <a:t>Alpha Zero – </a:t>
+            </a:r>
+            <a:r>
+              <a:rPr lang="de-DE" dirty="0" err="1"/>
+              <a:t>Neural</a:t>
+            </a:r>
+            <a:r>
+              <a:rPr lang="de-DE" dirty="0"/>
+              <a:t> network</a:t>
+            </a:r>
+            <a:endParaRPr lang="es-ES" dirty="0"/>
+          </a:p>
+        </p:txBody>
+      </p:sp>
+      <p:pic>
+        <p:nvPicPr>
+          <p:cNvPr id="5" name="Grafik 4">
+            <a:extLst>
+              <a:ext uri="{FF2B5EF4-FFF2-40B4-BE49-F238E27FC236}">
+                <a16:creationId xmlns:a16="http://schemas.microsoft.com/office/drawing/2014/main" id="{6F2B3800-F5B3-4168-E255-DDE73356B887}"/>
+              </a:ext>
+            </a:extLst>
+          </p:cNvPr>
+          <p:cNvPicPr>
+            <a:picLocks noChangeAspect="1"/>
+          </p:cNvPicPr>
+          <p:nvPr/>
+        </p:nvPicPr>
+        <p:blipFill>
+          <a:blip r:embed="rId2"/>
+          <a:srcRect t="12934" r="2515" b="2377"/>
+          <a:stretch/>
+        </p:blipFill>
+        <p:spPr>
+          <a:xfrm>
+            <a:off x="1219198" y="2294375"/>
+            <a:ext cx="6521203" cy="2818375"/>
+          </a:xfrm>
+          <a:prstGeom prst="rect">
+            <a:avLst/>
+          </a:prstGeom>
+        </p:spPr>
+      </p:pic>
+      <p:pic>
+        <p:nvPicPr>
+          <p:cNvPr id="9" name="Grafik 8">
+            <a:extLst>
+              <a:ext uri="{FF2B5EF4-FFF2-40B4-BE49-F238E27FC236}">
+                <a16:creationId xmlns:a16="http://schemas.microsoft.com/office/drawing/2014/main" id="{F108CC12-1443-5C74-E8EE-90F0DA346379}"/>
+              </a:ext>
+            </a:extLst>
+          </p:cNvPr>
+          <p:cNvPicPr>
+            <a:picLocks noChangeAspect="1"/>
+          </p:cNvPicPr>
+          <p:nvPr/>
+        </p:nvPicPr>
+        <p:blipFill>
+          <a:blip r:embed="rId3"/>
+          <a:stretch>
+            <a:fillRect/>
+          </a:stretch>
+        </p:blipFill>
+        <p:spPr>
+          <a:xfrm>
+            <a:off x="8859690" y="2572866"/>
+            <a:ext cx="2524284" cy="2017068"/>
+          </a:xfrm>
+          <a:prstGeom prst="rect">
+            <a:avLst/>
+          </a:prstGeom>
+        </p:spPr>
+      </p:pic>
+    </p:spTree>
+    <p:extLst>
+      <p:ext uri="{BB962C8B-B14F-4D97-AF65-F5344CB8AC3E}">
+        <p14:creationId xmlns:p14="http://schemas.microsoft.com/office/powerpoint/2010/main" val="2808769559"/>
+      </p:ext>
+    </p:extLst>
+  </p:cSld>
+  <p:clrMapOvr>
+    <a:masterClrMapping/>
+  </p:clrMapOvr>
+</p:sld>
+</file>
+
+<file path=ppt/slides/slide21.xml><?xml version="1.0" encoding="utf-8"?>
+<p:sld xmlns:a="http://schemas.openxmlformats.org/drawingml/2006/main" xmlns:r="http://schemas.openxmlformats.org/officeDocument/2006/relationships" xmlns:p="http://schemas.openxmlformats.org/presentationml/2006/main">
+  <p:cSld>
+    <p:spTree>
+      <p:nvGrpSpPr>
+        <p:cNvPr id="1" name="">
+          <a:extLst>
+            <a:ext uri="{FF2B5EF4-FFF2-40B4-BE49-F238E27FC236}">
               <a16:creationId xmlns:a16="http://schemas.microsoft.com/office/drawing/2014/main" id="{8EE0DCC6-AF72-F5EE-85A2-028E18C70C4C}"/>
             </a:ext>
           </a:extLst>
@@ -18251,7 +18444,7 @@
 </p:sld>
 </file>
 
-<file path=ppt/slides/slide21.xml><?xml version="1.0" encoding="utf-8"?>
+<file path=ppt/slides/slide22.xml><?xml version="1.0" encoding="utf-8"?>
 <p:sld xmlns:a="http://schemas.openxmlformats.org/drawingml/2006/main" xmlns:r="http://schemas.openxmlformats.org/officeDocument/2006/relationships" xmlns:p="http://schemas.openxmlformats.org/presentationml/2006/main">
   <p:cSld>
     <p:spTree>
@@ -18487,7 +18680,131 @@
 </p:sld>
 </file>
 
-<file path=ppt/slides/slide22.xml><?xml version="1.0" encoding="utf-8"?>
+<file path=ppt/slides/slide23.xml><?xml version="1.0" encoding="utf-8"?>
+<p:sld xmlns:a="http://schemas.openxmlformats.org/drawingml/2006/main" xmlns:r="http://schemas.openxmlformats.org/officeDocument/2006/relationships" xmlns:p="http://schemas.openxmlformats.org/presentationml/2006/main">
+  <p:cSld>
+    <p:spTree>
+      <p:nvGrpSpPr>
+        <p:cNvPr id="1" name="">
+          <a:extLst>
+            <a:ext uri="{FF2B5EF4-FFF2-40B4-BE49-F238E27FC236}">
+              <a16:creationId xmlns:a16="http://schemas.microsoft.com/office/drawing/2014/main" id="{5C01F682-DCC5-CA0D-D607-2E2A9CD2D6C5}"/>
+            </a:ext>
+          </a:extLst>
+        </p:cNvPr>
+        <p:cNvGrpSpPr/>
+        <p:nvPr/>
+      </p:nvGrpSpPr>
+      <p:grpSpPr>
+        <a:xfrm>
+          <a:off x="0" y="0"/>
+          <a:ext cx="0" cy="0"/>
+          <a:chOff x="0" y="0"/>
+          <a:chExt cx="0" cy="0"/>
+        </a:xfrm>
+      </p:grpSpPr>
+      <p:sp>
+        <p:nvSpPr>
+          <p:cNvPr id="2" name="Titel 1">
+            <a:extLst>
+              <a:ext uri="{FF2B5EF4-FFF2-40B4-BE49-F238E27FC236}">
+                <a16:creationId xmlns:a16="http://schemas.microsoft.com/office/drawing/2014/main" id="{2F447D9B-48BD-F72F-3116-ED47FA68B0DA}"/>
+              </a:ext>
+            </a:extLst>
+          </p:cNvPr>
+          <p:cNvSpPr>
+            <a:spLocks noGrp="1"/>
+          </p:cNvSpPr>
+          <p:nvPr>
+            <p:ph type="title"/>
+          </p:nvPr>
+        </p:nvSpPr>
+        <p:spPr/>
+        <p:txBody>
+          <a:bodyPr/>
+          <a:lstStyle/>
+          <a:p>
+            <a:r>
+              <a:rPr lang="de-DE" dirty="0"/>
+              <a:t>Alpha Zero – </a:t>
+            </a:r>
+            <a:r>
+              <a:rPr lang="de-DE" dirty="0" err="1"/>
+              <a:t>Neural</a:t>
+            </a:r>
+            <a:r>
+              <a:rPr lang="de-DE" dirty="0"/>
+              <a:t> network</a:t>
+            </a:r>
+            <a:endParaRPr lang="es-ES" dirty="0"/>
+          </a:p>
+        </p:txBody>
+      </p:sp>
+      <p:sp>
+        <p:nvSpPr>
+          <p:cNvPr id="3" name="Rechteck 2">
+            <a:hlinkClick r:id="rId2"/>
+            <a:extLst>
+              <a:ext uri="{FF2B5EF4-FFF2-40B4-BE49-F238E27FC236}">
+                <a16:creationId xmlns:a16="http://schemas.microsoft.com/office/drawing/2014/main" id="{619F2A7A-3B06-6D27-07FE-BC06B4D1990C}"/>
+              </a:ext>
+            </a:extLst>
+          </p:cNvPr>
+          <p:cNvSpPr/>
+          <p:nvPr/>
+        </p:nvSpPr>
+        <p:spPr>
+          <a:xfrm>
+            <a:off x="2699657" y="2373086"/>
+            <a:ext cx="6466114" cy="3102428"/>
+          </a:xfrm>
+          <a:prstGeom prst="rect">
+            <a:avLst/>
+          </a:prstGeom>
+        </p:spPr>
+        <p:style>
+          <a:lnRef idx="2">
+            <a:schemeClr val="accent2">
+              <a:shade val="15000"/>
+            </a:schemeClr>
+          </a:lnRef>
+          <a:fillRef idx="1">
+            <a:schemeClr val="accent2"/>
+          </a:fillRef>
+          <a:effectRef idx="0">
+            <a:schemeClr val="accent2"/>
+          </a:effectRef>
+          <a:fontRef idx="minor">
+            <a:schemeClr val="lt1"/>
+          </a:fontRef>
+        </p:style>
+        <p:txBody>
+          <a:bodyPr rtlCol="0" anchor="ctr"/>
+          <a:lstStyle/>
+          <a:p>
+            <a:pPr algn="ctr"/>
+            <a:r>
+              <a:rPr lang="de-DE" sz="9600" dirty="0"/>
+              <a:t>CODE</a:t>
+            </a:r>
+            <a:endParaRPr lang="es-ES" sz="9600" dirty="0"/>
+          </a:p>
+        </p:txBody>
+      </p:sp>
+    </p:spTree>
+    <p:extLst>
+      <p:ext uri="{BB962C8B-B14F-4D97-AF65-F5344CB8AC3E}">
+        <p14:creationId xmlns:p14="http://schemas.microsoft.com/office/powerpoint/2010/main" val="2236732906"/>
+      </p:ext>
+    </p:extLst>
+  </p:cSld>
+  <p:clrMapOvr>
+    <a:masterClrMapping/>
+  </p:clrMapOvr>
+</p:sld>
+</file>
+
+<file path=ppt/slides/slide24.xml><?xml version="1.0" encoding="utf-8"?>
 <p:sld xmlns:a="http://schemas.openxmlformats.org/drawingml/2006/main" xmlns:r="http://schemas.openxmlformats.org/officeDocument/2006/relationships" xmlns:p="http://schemas.openxmlformats.org/presentationml/2006/main">
   <p:cSld>
     <p:spTree>
@@ -18734,7 +19051,7 @@
 </p:sld>
 </file>
 
-<file path=ppt/slides/slide23.xml><?xml version="1.0" encoding="utf-8"?>
+<file path=ppt/slides/slide25.xml><?xml version="1.0" encoding="utf-8"?>
 <p:sld xmlns:a="http://schemas.openxmlformats.org/drawingml/2006/main" xmlns:r="http://schemas.openxmlformats.org/officeDocument/2006/relationships" xmlns:p="http://schemas.openxmlformats.org/presentationml/2006/main">
   <p:cSld>
     <p:spTree>
@@ -18854,7 +19171,7 @@
 </p:sld>
 </file>
 
-<file path=ppt/slides/slide24.xml><?xml version="1.0" encoding="utf-8"?>
+<file path=ppt/slides/slide26.xml><?xml version="1.0" encoding="utf-8"?>
 <p:sld xmlns:a="http://schemas.openxmlformats.org/drawingml/2006/main" xmlns:r="http://schemas.openxmlformats.org/officeDocument/2006/relationships" xmlns:p="http://schemas.openxmlformats.org/presentationml/2006/main">
   <p:cSld>
     <p:spTree>
@@ -19517,6 +19834,123 @@
                       </p:childTnLst>
                     </p:cTn>
                   </p:par>
+                  <p:par>
+                    <p:cTn id="19" fill="hold">
+                      <p:stCondLst>
+                        <p:cond delay="indefinite"/>
+                      </p:stCondLst>
+                      <p:childTnLst>
+                        <p:par>
+                          <p:cTn id="20" fill="hold">
+                            <p:stCondLst>
+                              <p:cond delay="0"/>
+                            </p:stCondLst>
+                            <p:childTnLst>
+                              <p:par>
+                                <p:cTn id="21" presetID="1" presetClass="entr" presetSubtype="0" fill="hold" nodeType="clickEffect">
+                                  <p:stCondLst>
+                                    <p:cond delay="0"/>
+                                  </p:stCondLst>
+                                  <p:childTnLst>
+                                    <p:set>
+                                      <p:cBhvr>
+                                        <p:cTn id="22" dur="1" fill="hold">
+                                          <p:stCondLst>
+                                            <p:cond delay="0"/>
+                                          </p:stCondLst>
+                                        </p:cTn>
+                                        <p:tgtEl>
+                                          <p:spTgt spid="18"/>
+                                        </p:tgtEl>
+                                        <p:attrNameLst>
+                                          <p:attrName>style.visibility</p:attrName>
+                                        </p:attrNameLst>
+                                      </p:cBhvr>
+                                      <p:to>
+                                        <p:strVal val="visible"/>
+                                      </p:to>
+                                    </p:set>
+                                  </p:childTnLst>
+                                </p:cTn>
+                              </p:par>
+                            </p:childTnLst>
+                          </p:cTn>
+                        </p:par>
+                      </p:childTnLst>
+                    </p:cTn>
+                  </p:par>
+                  <p:par>
+                    <p:cTn id="23" fill="hold">
+                      <p:stCondLst>
+                        <p:cond delay="indefinite"/>
+                      </p:stCondLst>
+                      <p:childTnLst>
+                        <p:par>
+                          <p:cTn id="24" fill="hold">
+                            <p:stCondLst>
+                              <p:cond delay="0"/>
+                            </p:stCondLst>
+                            <p:childTnLst>
+                              <p:par>
+                                <p:cTn id="25" presetID="1" presetClass="entr" presetSubtype="0" fill="hold" grpId="0" nodeType="clickEffect">
+                                  <p:stCondLst>
+                                    <p:cond delay="0"/>
+                                  </p:stCondLst>
+                                  <p:childTnLst>
+                                    <p:set>
+                                      <p:cBhvr>
+                                        <p:cTn id="26" dur="1" fill="hold">
+                                          <p:stCondLst>
+                                            <p:cond delay="0"/>
+                                          </p:stCondLst>
+                                        </p:cTn>
+                                        <p:tgtEl>
+                                          <p:spTgt spid="21"/>
+                                        </p:tgtEl>
+                                        <p:attrNameLst>
+                                          <p:attrName>style.visibility</p:attrName>
+                                        </p:attrNameLst>
+                                      </p:cBhvr>
+                                      <p:to>
+                                        <p:strVal val="visible"/>
+                                      </p:to>
+                                    </p:set>
+                                  </p:childTnLst>
+                                </p:cTn>
+                              </p:par>
+                              <p:par>
+                                <p:cTn id="27" presetID="1" presetClass="entr" presetSubtype="0" fill="hold" grpId="0" nodeType="withEffect">
+                                  <p:stCondLst>
+                                    <p:cond delay="0"/>
+                                  </p:stCondLst>
+                                  <p:childTnLst>
+                                    <p:set>
+                                      <p:cBhvr>
+                                        <p:cTn id="28" dur="1" fill="hold">
+                                          <p:stCondLst>
+                                            <p:cond delay="0"/>
+                                          </p:stCondLst>
+                                        </p:cTn>
+                                        <p:tgtEl>
+                                          <p:spTgt spid="20"/>
+                                        </p:tgtEl>
+                                        <p:attrNameLst>
+                                          <p:attrName>style.visibility</p:attrName>
+                                        </p:attrNameLst>
+                                      </p:cBhvr>
+                                      <p:to>
+                                        <p:strVal val="visible"/>
+                                      </p:to>
+                                    </p:set>
+                                  </p:childTnLst>
+                                </p:cTn>
+                              </p:par>
+                            </p:childTnLst>
+                          </p:cTn>
+                        </p:par>
+                      </p:childTnLst>
+                    </p:cTn>
+                  </p:par>
                 </p:childTnLst>
               </p:cTn>
               <p:prevCondLst>
@@ -19538,6 +19972,10 @@
         </p:cTn>
       </p:par>
     </p:tnLst>
+    <p:bldLst>
+      <p:bldP spid="20" grpId="0" animBg="1"/>
+      <p:bldP spid="21" grpId="0"/>
+    </p:bldLst>
   </p:timing>
 </p:sld>
 </file>
@@ -20488,6 +20926,60 @@
                                   </p:childTnLst>
                                 </p:cTn>
                               </p:par>
+                              <p:par>
+                                <p:cTn id="7" presetID="1" presetClass="entr" presetSubtype="0" fill="hold" grpId="0" nodeType="withEffect">
+                                  <p:stCondLst>
+                                    <p:cond delay="0"/>
+                                  </p:stCondLst>
+                                  <p:childTnLst>
+                                    <p:set>
+                                      <p:cBhvr>
+                                        <p:cTn id="8" dur="1" fill="hold">
+                                          <p:stCondLst>
+                                            <p:cond delay="0"/>
+                                          </p:stCondLst>
+                                        </p:cTn>
+                                        <p:tgtEl>
+                                          <p:spTgt spid="10"/>
+                                        </p:tgtEl>
+                                        <p:attrNameLst>
+                                          <p:attrName>style.visibility</p:attrName>
+                                        </p:attrNameLst>
+                                      </p:cBhvr>
+                                      <p:to>
+                                        <p:strVal val="visible"/>
+                                      </p:to>
+                                    </p:set>
+                                  </p:childTnLst>
+                                </p:cTn>
+                              </p:par>
+                              <p:par>
+                                <p:cTn id="9" presetID="1" presetClass="entr" presetSubtype="0" fill="hold" grpId="0" nodeType="withEffect">
+                                  <p:stCondLst>
+                                    <p:cond delay="0"/>
+                                  </p:stCondLst>
+                                  <p:childTnLst>
+                                    <p:set>
+                                      <p:cBhvr>
+                                        <p:cTn id="10" dur="1" fill="hold">
+                                          <p:stCondLst>
+                                            <p:cond delay="0"/>
+                                          </p:stCondLst>
+                                        </p:cTn>
+                                        <p:tgtEl>
+                                          <p:spTgt spid="11"/>
+                                        </p:tgtEl>
+                                        <p:attrNameLst>
+                                          <p:attrName>style.visibility</p:attrName>
+                                        </p:attrNameLst>
+                                      </p:cBhvr>
+                                      <p:to>
+                                        <p:strVal val="visible"/>
+                                      </p:to>
+                                    </p:set>
+                                  </p:childTnLst>
+                                </p:cTn>
+                              </p:par>
                             </p:childTnLst>
                           </p:cTn>
                         </p:par>
@@ -20517,6 +21009,8 @@
     </p:tnLst>
     <p:bldLst>
       <p:bldP spid="3" grpId="0" animBg="1"/>
+      <p:bldP spid="10" grpId="0"/>
+      <p:bldP spid="11" grpId="0"/>
     </p:bldLst>
   </p:timing>
 </p:sld>
@@ -20663,7 +21157,11 @@
           <a:p>
             <a:r>
               <a:rPr lang="de-DE" dirty="0"/>
-              <a:t>Computer Engine – Reinforcement Learning</a:t>
+              <a:t>Computer Engine – RL </a:t>
+            </a:r>
+            <a:r>
+              <a:rPr lang="de-DE" dirty="0" err="1"/>
+              <a:t>Agents</a:t>
             </a:r>
             <a:endParaRPr lang="es-ES" dirty="0"/>
           </a:p>
@@ -20811,18 +21309,101 @@
           <a:p>
             <a:r>
               <a:rPr lang="de-DE" dirty="0"/>
-              <a:t>Alpha Zero - MCTS </a:t>
+              <a:t>Alpha Zero – General Information</a:t>
             </a:r>
             <a:endParaRPr lang="es-ES" dirty="0"/>
+          </a:p>
+        </p:txBody>
+      </p:sp>
+      <p:sp>
+        <p:nvSpPr>
+          <p:cNvPr id="9" name="Textfeld 8">
+            <a:extLst>
+              <a:ext uri="{FF2B5EF4-FFF2-40B4-BE49-F238E27FC236}">
+                <a16:creationId xmlns:a16="http://schemas.microsoft.com/office/drawing/2014/main" id="{E2A5E623-A2C5-0228-83D5-2122A84A586D}"/>
+              </a:ext>
+            </a:extLst>
+          </p:cNvPr>
+          <p:cNvSpPr txBox="1"/>
+          <p:nvPr/>
+        </p:nvSpPr>
+        <p:spPr>
+          <a:xfrm>
+            <a:off x="454892" y="1856509"/>
+            <a:ext cx="6278417" cy="2062103"/>
+          </a:xfrm>
+          <a:prstGeom prst="rect">
+            <a:avLst/>
+          </a:prstGeom>
+          <a:noFill/>
+        </p:spPr>
+        <p:txBody>
+          <a:bodyPr wrap="square" rtlCol="0">
+            <a:spAutoFit/>
+          </a:bodyPr>
+          <a:lstStyle/>
+          <a:p>
+            <a:pPr marL="285750" indent="-285750">
+              <a:buFontTx/>
+              <a:buChar char="-"/>
+            </a:pPr>
+            <a:r>
+              <a:rPr lang="de-DE" sz="3200" dirty="0" err="1"/>
+              <a:t>Published</a:t>
+            </a:r>
+            <a:r>
+              <a:rPr lang="de-DE" sz="3200" dirty="0"/>
+              <a:t> in 2017 </a:t>
+            </a:r>
+            <a:r>
+              <a:rPr lang="de-DE" sz="3200" dirty="0" err="1"/>
+              <a:t>by</a:t>
+            </a:r>
+            <a:r>
+              <a:rPr lang="de-DE" sz="3200" dirty="0"/>
+              <a:t> Google</a:t>
+            </a:r>
+          </a:p>
+          <a:p>
+            <a:pPr marL="285750" indent="-285750">
+              <a:buFontTx/>
+              <a:buChar char="-"/>
+            </a:pPr>
+            <a:r>
+              <a:rPr lang="de-DE" sz="3200" dirty="0"/>
+              <a:t>Deep Reinforcement Learning</a:t>
+            </a:r>
+          </a:p>
+          <a:p>
+            <a:pPr marL="285750" indent="-285750">
+              <a:buFontTx/>
+              <a:buChar char="-"/>
+            </a:pPr>
+            <a:r>
+              <a:rPr lang="de-DE" sz="3200" dirty="0"/>
+              <a:t>Chess, Go and </a:t>
+            </a:r>
+            <a:r>
+              <a:rPr lang="de-DE" sz="3200" dirty="0" err="1"/>
+              <a:t>Shogi</a:t>
+            </a:r>
+            <a:endParaRPr lang="de-DE" sz="3200" dirty="0"/>
+          </a:p>
+          <a:p>
+            <a:pPr marL="285750" indent="-285750">
+              <a:buFontTx/>
+              <a:buChar char="-"/>
+            </a:pPr>
+            <a:endParaRPr lang="de-DE" sz="3200" dirty="0"/>
           </a:p>
         </p:txBody>
       </p:sp>
       <p:pic>
         <p:nvPicPr>
-          <p:cNvPr id="4" name="Grafik 3">
+          <p:cNvPr id="15" name="Grafik 14">
             <a:extLst>
               <a:ext uri="{FF2B5EF4-FFF2-40B4-BE49-F238E27FC236}">
-                <a16:creationId xmlns:a16="http://schemas.microsoft.com/office/drawing/2014/main" id="{7495059B-EA6E-B4BE-EC5F-9E4605C192B1}"/>
+                <a16:creationId xmlns:a16="http://schemas.microsoft.com/office/drawing/2014/main" id="{946E2F4B-9A03-9AA8-8F5D-E1838C656F3F}"/>
               </a:ext>
             </a:extLst>
           </p:cNvPr>
@@ -20839,27 +21420,90 @@
         </p:blipFill>
         <p:spPr>
           <a:xfrm>
-            <a:off x="6389564" y="748142"/>
-            <a:ext cx="6733000" cy="5860473"/>
+            <a:off x="5844633" y="3429000"/>
+            <a:ext cx="5777025" cy="2619346"/>
           </a:xfrm>
           <a:prstGeom prst="rect">
             <a:avLst/>
           </a:prstGeom>
-          <a:effectLst>
-            <a:glow rad="127000">
-              <a:schemeClr val="accent1">
-                <a:alpha val="40000"/>
-              </a:schemeClr>
-            </a:glow>
-          </a:effectLst>
         </p:spPr>
       </p:pic>
+    </p:spTree>
+    <p:extLst>
+      <p:ext uri="{BB962C8B-B14F-4D97-AF65-F5344CB8AC3E}">
+        <p14:creationId xmlns:p14="http://schemas.microsoft.com/office/powerpoint/2010/main" val="3914784794"/>
+      </p:ext>
+    </p:extLst>
+  </p:cSld>
+  <p:clrMapOvr>
+    <a:masterClrMapping/>
+  </p:clrMapOvr>
+</p:sld>
+</file>
+
+<file path=ppt/slides/slide9.xml><?xml version="1.0" encoding="utf-8"?>
+<p:sld xmlns:a="http://schemas.openxmlformats.org/drawingml/2006/main" xmlns:r="http://schemas.openxmlformats.org/officeDocument/2006/relationships" xmlns:p="http://schemas.openxmlformats.org/presentationml/2006/main">
+  <p:cSld>
+    <p:spTree>
+      <p:nvGrpSpPr>
+        <p:cNvPr id="1" name="">
+          <a:extLst>
+            <a:ext uri="{FF2B5EF4-FFF2-40B4-BE49-F238E27FC236}">
+              <a16:creationId xmlns:a16="http://schemas.microsoft.com/office/drawing/2014/main" id="{4C80FDE1-41B5-0FCC-B7ED-64455CB8CE39}"/>
+            </a:ext>
+          </a:extLst>
+        </p:cNvPr>
+        <p:cNvGrpSpPr/>
+        <p:nvPr/>
+      </p:nvGrpSpPr>
+      <p:grpSpPr>
+        <a:xfrm>
+          <a:off x="0" y="0"/>
+          <a:ext cx="0" cy="0"/>
+          <a:chOff x="0" y="0"/>
+          <a:chExt cx="0" cy="0"/>
+        </a:xfrm>
+      </p:grpSpPr>
+      <p:sp>
+        <p:nvSpPr>
+          <p:cNvPr id="2" name="Titel 1">
+            <a:extLst>
+              <a:ext uri="{FF2B5EF4-FFF2-40B4-BE49-F238E27FC236}">
+                <a16:creationId xmlns:a16="http://schemas.microsoft.com/office/drawing/2014/main" id="{C162DB63-C8EA-C84F-5AC8-18A1DFCB6DD9}"/>
+              </a:ext>
+            </a:extLst>
+          </p:cNvPr>
+          <p:cNvSpPr>
+            <a:spLocks noGrp="1"/>
+          </p:cNvSpPr>
+          <p:nvPr>
+            <p:ph type="title"/>
+          </p:nvPr>
+        </p:nvSpPr>
+        <p:spPr>
+          <a:xfrm>
+            <a:off x="454892" y="20009"/>
+            <a:ext cx="10131425" cy="1456267"/>
+          </a:xfrm>
+        </p:spPr>
+        <p:txBody>
+          <a:bodyPr/>
+          <a:lstStyle/>
+          <a:p>
+            <a:r>
+              <a:rPr lang="de-DE" dirty="0"/>
+              <a:t>Alpha Zero - MCTS </a:t>
+            </a:r>
+            <a:endParaRPr lang="es-ES" dirty="0"/>
+          </a:p>
+        </p:txBody>
+      </p:sp>
       <p:sp>
         <p:nvSpPr>
           <p:cNvPr id="5" name="Textfeld 4">
             <a:extLst>
               <a:ext uri="{FF2B5EF4-FFF2-40B4-BE49-F238E27FC236}">
-                <a16:creationId xmlns:a16="http://schemas.microsoft.com/office/drawing/2014/main" id="{B78853C1-1CCD-EEA7-1AD9-F633DCC83E84}"/>
+                <a16:creationId xmlns:a16="http://schemas.microsoft.com/office/drawing/2014/main" id="{B4655D9F-1D20-C536-4CB9-6389031140DC}"/>
               </a:ext>
             </a:extLst>
           </p:cNvPr>
@@ -20868,8 +21512,8 @@
         </p:nvSpPr>
         <p:spPr>
           <a:xfrm>
-            <a:off x="454892" y="1273076"/>
-            <a:ext cx="4514272" cy="1200329"/>
+            <a:off x="1006332" y="2564870"/>
+            <a:ext cx="4514272" cy="1815882"/>
           </a:xfrm>
           <a:prstGeom prst="rect">
             <a:avLst/>
@@ -20886,17 +21530,17 @@
               <a:buAutoNum type="arabicPeriod"/>
             </a:pPr>
             <a:r>
-              <a:rPr lang="de-DE" dirty="0" err="1"/>
+              <a:rPr lang="de-DE" sz="2800" dirty="0" err="1"/>
               <a:t>Selection</a:t>
             </a:r>
-            <a:endParaRPr lang="de-DE" dirty="0"/>
+            <a:endParaRPr lang="de-DE" sz="2800" dirty="0"/>
           </a:p>
           <a:p>
             <a:pPr marL="342900" indent="-342900">
               <a:buAutoNum type="arabicPeriod"/>
             </a:pPr>
             <a:r>
-              <a:rPr lang="de-DE" dirty="0"/>
+              <a:rPr lang="de-DE" sz="2800" dirty="0"/>
               <a:t>Expansion</a:t>
             </a:r>
           </a:p>
@@ -20905,7 +21549,7 @@
               <a:buAutoNum type="arabicPeriod"/>
             </a:pPr>
             <a:r>
-              <a:rPr lang="de-DE" dirty="0"/>
+              <a:rPr lang="de-DE" sz="2800" dirty="0"/>
               <a:t>Simulation</a:t>
             </a:r>
           </a:p>
@@ -20914,10 +21558,10 @@
               <a:buAutoNum type="arabicPeriod"/>
             </a:pPr>
             <a:r>
-              <a:rPr lang="de-DE" dirty="0"/>
+              <a:rPr lang="de-DE" sz="2800" dirty="0"/>
               <a:t>Backpropagation</a:t>
             </a:r>
-            <a:endParaRPr lang="es-ES" dirty="0"/>
+            <a:endParaRPr lang="es-ES" sz="2800" dirty="0"/>
           </a:p>
         </p:txBody>
       </p:sp>
@@ -20926,7 +21570,7 @@
           <p:cNvPr id="7" name="Rechteck 6">
             <a:extLst>
               <a:ext uri="{FF2B5EF4-FFF2-40B4-BE49-F238E27FC236}">
-                <a16:creationId xmlns:a16="http://schemas.microsoft.com/office/drawing/2014/main" id="{EA5D5A7A-0E5F-28B7-4DF4-2490B6837769}"/>
+                <a16:creationId xmlns:a16="http://schemas.microsoft.com/office/drawing/2014/main" id="{49BAF51A-F226-CF49-DE81-C5CF49F6B250}"/>
               </a:ext>
             </a:extLst>
           </p:cNvPr>
@@ -20935,7 +21579,7 @@
         </p:nvSpPr>
         <p:spPr>
           <a:xfrm>
-            <a:off x="563418" y="1995054"/>
+            <a:off x="1482766" y="3700154"/>
             <a:ext cx="1450109" cy="45719"/>
           </a:xfrm>
           <a:prstGeom prst="rect">
@@ -20973,7 +21617,7 @@
           <p:cNvPr id="8" name="Textfeld 7">
             <a:extLst>
               <a:ext uri="{FF2B5EF4-FFF2-40B4-BE49-F238E27FC236}">
-                <a16:creationId xmlns:a16="http://schemas.microsoft.com/office/drawing/2014/main" id="{030D06E7-E81D-8F46-0058-9067EFBF6F5C}"/>
+                <a16:creationId xmlns:a16="http://schemas.microsoft.com/office/drawing/2014/main" id="{E194C898-07A7-7B7E-5C99-15B886654D87}"/>
               </a:ext>
             </a:extLst>
           </p:cNvPr>
@@ -20982,7 +21626,7 @@
         </p:nvSpPr>
         <p:spPr>
           <a:xfrm>
-            <a:off x="3371273" y="1801151"/>
+            <a:off x="4290621" y="3506251"/>
             <a:ext cx="2032000" cy="369332"/>
           </a:xfrm>
           <a:prstGeom prst="rect">
@@ -21009,7 +21653,7 @@
           <p:cNvPr id="10" name="Gerade Verbindung mit Pfeil 9">
             <a:extLst>
               <a:ext uri="{FF2B5EF4-FFF2-40B4-BE49-F238E27FC236}">
-                <a16:creationId xmlns:a16="http://schemas.microsoft.com/office/drawing/2014/main" id="{DF69DF36-1E11-5E7C-CD3F-B19430EC0E63}"/>
+                <a16:creationId xmlns:a16="http://schemas.microsoft.com/office/drawing/2014/main" id="{67AE4ED3-E446-7E7F-60EB-A9273AF6AD13}"/>
               </a:ext>
             </a:extLst>
           </p:cNvPr>
@@ -21020,7 +21664,7 @@
         </p:nvCxnSpPr>
         <p:spPr>
           <a:xfrm flipH="1">
-            <a:off x="2253673" y="1985817"/>
+            <a:off x="3173021" y="3690917"/>
             <a:ext cx="1117600" cy="36000"/>
           </a:xfrm>
           <a:prstGeom prst="straightConnector1">
@@ -21050,10 +21694,10 @@
       </p:cxnSp>
       <p:pic>
         <p:nvPicPr>
-          <p:cNvPr id="13" name="Grafik 12">
+          <p:cNvPr id="4" name="Grafik 3" descr="Ein Bild, das Screenshot, Kreis, Reihe, Farbigkeit enthält.&#10;&#10;Automatisch generierte Beschreibung">
             <a:extLst>
               <a:ext uri="{FF2B5EF4-FFF2-40B4-BE49-F238E27FC236}">
-                <a16:creationId xmlns:a16="http://schemas.microsoft.com/office/drawing/2014/main" id="{9C20752F-5934-D4C1-D610-862DCC78726A}"/>
+                <a16:creationId xmlns:a16="http://schemas.microsoft.com/office/drawing/2014/main" id="{FC45B606-D150-D3A2-5A8E-063FE76B41EB}"/>
               </a:ext>
             </a:extLst>
           </p:cNvPr>
@@ -21063,32 +21707,31 @@
           <p:nvPr/>
         </p:nvPicPr>
         <p:blipFill>
-          <a:blip r:embed="rId3"/>
+          <a:blip r:embed="rId2">
+            <a:extLst>
+              <a:ext uri="{28A0092B-C50C-407E-A947-70E740481C1C}">
+                <a14:useLocalDpi xmlns:a14="http://schemas.microsoft.com/office/drawing/2010/main" val="0"/>
+              </a:ext>
+            </a:extLst>
+          </a:blip>
           <a:stretch>
             <a:fillRect/>
           </a:stretch>
         </p:blipFill>
         <p:spPr>
           <a:xfrm>
-            <a:off x="2253673" y="2676605"/>
-            <a:ext cx="3686942" cy="4007310"/>
+            <a:off x="7888307" y="1221728"/>
+            <a:ext cx="3437206" cy="4221130"/>
           </a:xfrm>
           <a:prstGeom prst="rect">
             <a:avLst/>
           </a:prstGeom>
-          <a:effectLst>
-            <a:glow rad="127000">
-              <a:schemeClr val="accent1">
-                <a:alpha val="40000"/>
-              </a:schemeClr>
-            </a:glow>
-          </a:effectLst>
         </p:spPr>
       </p:pic>
     </p:spTree>
     <p:extLst>
       <p:ext uri="{BB962C8B-B14F-4D97-AF65-F5344CB8AC3E}">
-        <p14:creationId xmlns:p14="http://schemas.microsoft.com/office/powerpoint/2010/main" val="3914784794"/>
+        <p14:creationId xmlns:p14="http://schemas.microsoft.com/office/powerpoint/2010/main" val="4223771690"/>
       </p:ext>
     </p:extLst>
   </p:cSld>
@@ -21196,33 +21839,6 @@
                                   </p:childTnLst>
                                 </p:cTn>
                               </p:par>
-                              <p:par>
-                                <p:cTn id="11" presetID="1" presetClass="entr" presetSubtype="0" fill="hold" nodeType="withEffect">
-                                  <p:stCondLst>
-                                    <p:cond delay="0"/>
-                                  </p:stCondLst>
-                                  <p:childTnLst>
-                                    <p:set>
-                                      <p:cBhvr>
-                                        <p:cTn id="12" dur="1" fill="hold">
-                                          <p:stCondLst>
-                                            <p:cond delay="0"/>
-                                          </p:stCondLst>
-                                        </p:cTn>
-                                        <p:tgtEl>
-                                          <p:spTgt spid="4"/>
-                                        </p:tgtEl>
-                                        <p:attrNameLst>
-                                          <p:attrName>style.visibility</p:attrName>
-                                        </p:attrNameLst>
-                                      </p:cBhvr>
-                                      <p:to>
-                                        <p:strVal val="visible"/>
-                                      </p:to>
-                                    </p:set>
-                                  </p:childTnLst>
-                                </p:cTn>
-                              </p:par>
                             </p:childTnLst>
                           </p:cTn>
                         </p:par>
@@ -21255,561 +21871,6 @@
       <p:bldP spid="8" grpId="0"/>
     </p:bldLst>
   </p:timing>
-</p:sld>
-</file>
-
-<file path=ppt/slides/slide9.xml><?xml version="1.0" encoding="utf-8"?>
-<p:sld xmlns:a="http://schemas.openxmlformats.org/drawingml/2006/main" xmlns:r="http://schemas.openxmlformats.org/officeDocument/2006/relationships" xmlns:p="http://schemas.openxmlformats.org/presentationml/2006/main">
-  <p:cSld>
-    <p:spTree>
-      <p:nvGrpSpPr>
-        <p:cNvPr id="1" name=""/>
-        <p:cNvGrpSpPr/>
-        <p:nvPr/>
-      </p:nvGrpSpPr>
-      <p:grpSpPr>
-        <a:xfrm>
-          <a:off x="0" y="0"/>
-          <a:ext cx="0" cy="0"/>
-          <a:chOff x="0" y="0"/>
-          <a:chExt cx="0" cy="0"/>
-        </a:xfrm>
-      </p:grpSpPr>
-      <p:sp>
-        <p:nvSpPr>
-          <p:cNvPr id="2" name="Titel 1">
-            <a:extLst>
-              <a:ext uri="{FF2B5EF4-FFF2-40B4-BE49-F238E27FC236}">
-                <a16:creationId xmlns:a16="http://schemas.microsoft.com/office/drawing/2014/main" id="{6C3BD070-EBEF-7F89-0C82-9576F1191F75}"/>
-              </a:ext>
-            </a:extLst>
-          </p:cNvPr>
-          <p:cNvSpPr>
-            <a:spLocks noGrp="1"/>
-          </p:cNvSpPr>
-          <p:nvPr>
-            <p:ph type="title"/>
-          </p:nvPr>
-        </p:nvSpPr>
-        <p:spPr/>
-        <p:txBody>
-          <a:bodyPr/>
-          <a:lstStyle/>
-          <a:p>
-            <a:r>
-              <a:rPr lang="de-DE" dirty="0"/>
-              <a:t>Alpha Zero - MCTS </a:t>
-            </a:r>
-            <a:endParaRPr lang="es-ES" dirty="0"/>
-          </a:p>
-        </p:txBody>
-      </p:sp>
-      <p:sp>
-        <p:nvSpPr>
-          <p:cNvPr id="4" name="Ellipse 3">
-            <a:extLst>
-              <a:ext uri="{FF2B5EF4-FFF2-40B4-BE49-F238E27FC236}">
-                <a16:creationId xmlns:a16="http://schemas.microsoft.com/office/drawing/2014/main" id="{42B29592-5718-A431-E438-408F9FF89346}"/>
-              </a:ext>
-            </a:extLst>
-          </p:cNvPr>
-          <p:cNvSpPr/>
-          <p:nvPr/>
-        </p:nvSpPr>
-        <p:spPr>
-          <a:xfrm>
-            <a:off x="6872866" y="1899634"/>
-            <a:ext cx="716684" cy="594206"/>
-          </a:xfrm>
-          <a:prstGeom prst="ellipse">
-            <a:avLst/>
-          </a:prstGeom>
-        </p:spPr>
-        <p:style>
-          <a:lnRef idx="1">
-            <a:schemeClr val="dk1"/>
-          </a:lnRef>
-          <a:fillRef idx="2">
-            <a:schemeClr val="dk1"/>
-          </a:fillRef>
-          <a:effectRef idx="1">
-            <a:schemeClr val="dk1"/>
-          </a:effectRef>
-          <a:fontRef idx="minor">
-            <a:schemeClr val="dk1"/>
-          </a:fontRef>
-        </p:style>
-        <p:txBody>
-          <a:bodyPr rtlCol="0" anchor="ctr"/>
-          <a:lstStyle/>
-          <a:p>
-            <a:pPr algn="ctr"/>
-            <a:r>
-              <a:rPr lang="de-DE" dirty="0"/>
-              <a:t>S₀</a:t>
-            </a:r>
-            <a:endParaRPr lang="es-ES" dirty="0"/>
-          </a:p>
-        </p:txBody>
-      </p:sp>
-      <p:sp>
-        <p:nvSpPr>
-          <p:cNvPr id="5" name="Ellipse 4">
-            <a:extLst>
-              <a:ext uri="{FF2B5EF4-FFF2-40B4-BE49-F238E27FC236}">
-                <a16:creationId xmlns:a16="http://schemas.microsoft.com/office/drawing/2014/main" id="{2649A4B2-276D-E080-98BE-9B2B881D9B1D}"/>
-              </a:ext>
-            </a:extLst>
-          </p:cNvPr>
-          <p:cNvSpPr/>
-          <p:nvPr/>
-        </p:nvSpPr>
-        <p:spPr>
-          <a:xfrm>
-            <a:off x="8309987" y="3516019"/>
-            <a:ext cx="716684" cy="594206"/>
-          </a:xfrm>
-          <a:prstGeom prst="ellipse">
-            <a:avLst/>
-          </a:prstGeom>
-        </p:spPr>
-        <p:style>
-          <a:lnRef idx="1">
-            <a:schemeClr val="dk1"/>
-          </a:lnRef>
-          <a:fillRef idx="2">
-            <a:schemeClr val="dk1"/>
-          </a:fillRef>
-          <a:effectRef idx="1">
-            <a:schemeClr val="dk1"/>
-          </a:effectRef>
-          <a:fontRef idx="minor">
-            <a:schemeClr val="dk1"/>
-          </a:fontRef>
-        </p:style>
-        <p:txBody>
-          <a:bodyPr rtlCol="0" anchor="ctr"/>
-          <a:lstStyle/>
-          <a:p>
-            <a:pPr algn="ctr"/>
-            <a:r>
-              <a:rPr lang="de-DE" dirty="0"/>
-              <a:t>S₂</a:t>
-            </a:r>
-            <a:endParaRPr lang="es-ES" dirty="0"/>
-          </a:p>
-        </p:txBody>
-      </p:sp>
-      <p:sp>
-        <p:nvSpPr>
-          <p:cNvPr id="6" name="Ellipse 5">
-            <a:extLst>
-              <a:ext uri="{FF2B5EF4-FFF2-40B4-BE49-F238E27FC236}">
-                <a16:creationId xmlns:a16="http://schemas.microsoft.com/office/drawing/2014/main" id="{AAE38128-D29D-EE12-4253-A9B3AD23EE8C}"/>
-              </a:ext>
-            </a:extLst>
-          </p:cNvPr>
-          <p:cNvSpPr/>
-          <p:nvPr/>
-        </p:nvSpPr>
-        <p:spPr>
-          <a:xfrm>
-            <a:off x="5193976" y="3429000"/>
-            <a:ext cx="716684" cy="594206"/>
-          </a:xfrm>
-          <a:prstGeom prst="ellipse">
-            <a:avLst/>
-          </a:prstGeom>
-        </p:spPr>
-        <p:style>
-          <a:lnRef idx="1">
-            <a:schemeClr val="dk1"/>
-          </a:lnRef>
-          <a:fillRef idx="2">
-            <a:schemeClr val="dk1"/>
-          </a:fillRef>
-          <a:effectRef idx="1">
-            <a:schemeClr val="dk1"/>
-          </a:effectRef>
-          <a:fontRef idx="minor">
-            <a:schemeClr val="dk1"/>
-          </a:fontRef>
-        </p:style>
-        <p:txBody>
-          <a:bodyPr rtlCol="0" anchor="ctr"/>
-          <a:lstStyle/>
-          <a:p>
-            <a:pPr algn="ctr"/>
-            <a:r>
-              <a:rPr lang="de-DE" dirty="0"/>
-              <a:t>S₁</a:t>
-            </a:r>
-            <a:endParaRPr lang="es-ES" dirty="0"/>
-          </a:p>
-        </p:txBody>
-      </p:sp>
-      <p:sp>
-        <p:nvSpPr>
-          <p:cNvPr id="7" name="Ellipse 6">
-            <a:extLst>
-              <a:ext uri="{FF2B5EF4-FFF2-40B4-BE49-F238E27FC236}">
-                <a16:creationId xmlns:a16="http://schemas.microsoft.com/office/drawing/2014/main" id="{2005557C-098F-4E83-94A0-D0E3552E3CD2}"/>
-              </a:ext>
-            </a:extLst>
-          </p:cNvPr>
-          <p:cNvSpPr/>
-          <p:nvPr/>
-        </p:nvSpPr>
-        <p:spPr>
-          <a:xfrm>
-            <a:off x="3654071" y="4792134"/>
-            <a:ext cx="716684" cy="594206"/>
-          </a:xfrm>
-          <a:prstGeom prst="ellipse">
-            <a:avLst/>
-          </a:prstGeom>
-        </p:spPr>
-        <p:style>
-          <a:lnRef idx="1">
-            <a:schemeClr val="dk1"/>
-          </a:lnRef>
-          <a:fillRef idx="2">
-            <a:schemeClr val="dk1"/>
-          </a:fillRef>
-          <a:effectRef idx="1">
-            <a:schemeClr val="dk1"/>
-          </a:effectRef>
-          <a:fontRef idx="minor">
-            <a:schemeClr val="dk1"/>
-          </a:fontRef>
-        </p:style>
-        <p:txBody>
-          <a:bodyPr rtlCol="0" anchor="ctr"/>
-          <a:lstStyle/>
-          <a:p>
-            <a:pPr algn="ctr"/>
-            <a:r>
-              <a:rPr lang="de-DE" dirty="0"/>
-              <a:t>S₃</a:t>
-            </a:r>
-            <a:endParaRPr lang="es-ES" dirty="0"/>
-          </a:p>
-        </p:txBody>
-      </p:sp>
-      <p:sp>
-        <p:nvSpPr>
-          <p:cNvPr id="8" name="Ellipse 7">
-            <a:extLst>
-              <a:ext uri="{FF2B5EF4-FFF2-40B4-BE49-F238E27FC236}">
-                <a16:creationId xmlns:a16="http://schemas.microsoft.com/office/drawing/2014/main" id="{37C9BAAB-E9CC-3BCE-EAAF-DB764C624DA5}"/>
-              </a:ext>
-            </a:extLst>
-          </p:cNvPr>
-          <p:cNvSpPr/>
-          <p:nvPr/>
-        </p:nvSpPr>
-        <p:spPr>
-          <a:xfrm>
-            <a:off x="6674717" y="4792134"/>
-            <a:ext cx="716684" cy="594206"/>
-          </a:xfrm>
-          <a:prstGeom prst="ellipse">
-            <a:avLst/>
-          </a:prstGeom>
-        </p:spPr>
-        <p:style>
-          <a:lnRef idx="1">
-            <a:schemeClr val="dk1"/>
-          </a:lnRef>
-          <a:fillRef idx="2">
-            <a:schemeClr val="dk1"/>
-          </a:fillRef>
-          <a:effectRef idx="1">
-            <a:schemeClr val="dk1"/>
-          </a:effectRef>
-          <a:fontRef idx="minor">
-            <a:schemeClr val="dk1"/>
-          </a:fontRef>
-        </p:style>
-        <p:txBody>
-          <a:bodyPr rtlCol="0" anchor="ctr"/>
-          <a:lstStyle/>
-          <a:p>
-            <a:pPr algn="ctr"/>
-            <a:r>
-              <a:rPr lang="de-DE" dirty="0"/>
-              <a:t>S₄</a:t>
-            </a:r>
-            <a:endParaRPr lang="es-ES" dirty="0"/>
-          </a:p>
-        </p:txBody>
-      </p:sp>
-      <p:cxnSp>
-        <p:nvCxnSpPr>
-          <p:cNvPr id="10" name="Gerade Verbindung mit Pfeil 9">
-            <a:extLst>
-              <a:ext uri="{FF2B5EF4-FFF2-40B4-BE49-F238E27FC236}">
-                <a16:creationId xmlns:a16="http://schemas.microsoft.com/office/drawing/2014/main" id="{07A97463-83A8-9460-9509-17BA7ECB4637}"/>
-              </a:ext>
-            </a:extLst>
-          </p:cNvPr>
-          <p:cNvCxnSpPr>
-            <a:cxnSpLocks/>
-            <a:stCxn id="4" idx="3"/>
-            <a:endCxn id="6" idx="7"/>
-          </p:cNvCxnSpPr>
-          <p:nvPr/>
-        </p:nvCxnSpPr>
-        <p:spPr>
-          <a:xfrm flipH="1">
-            <a:off x="5805704" y="2406821"/>
-            <a:ext cx="1172118" cy="1109198"/>
-          </a:xfrm>
-          <a:prstGeom prst="straightConnector1">
-            <a:avLst/>
-          </a:prstGeom>
-          <a:ln w="38100">
-            <a:tailEnd type="triangle"/>
-          </a:ln>
-        </p:spPr>
-        <p:style>
-          <a:lnRef idx="1">
-            <a:schemeClr val="accent6"/>
-          </a:lnRef>
-          <a:fillRef idx="0">
-            <a:schemeClr val="accent6"/>
-          </a:fillRef>
-          <a:effectRef idx="0">
-            <a:schemeClr val="accent6"/>
-          </a:effectRef>
-          <a:fontRef idx="minor">
-            <a:schemeClr val="tx1"/>
-          </a:fontRef>
-        </p:style>
-      </p:cxnSp>
-      <p:cxnSp>
-        <p:nvCxnSpPr>
-          <p:cNvPr id="12" name="Gerade Verbindung mit Pfeil 11">
-            <a:extLst>
-              <a:ext uri="{FF2B5EF4-FFF2-40B4-BE49-F238E27FC236}">
-                <a16:creationId xmlns:a16="http://schemas.microsoft.com/office/drawing/2014/main" id="{3ED1DB2B-19D5-638A-CE04-7364E1457338}"/>
-              </a:ext>
-            </a:extLst>
-          </p:cNvPr>
-          <p:cNvCxnSpPr>
-            <a:cxnSpLocks/>
-            <a:stCxn id="4" idx="5"/>
-            <a:endCxn id="5" idx="1"/>
-          </p:cNvCxnSpPr>
-          <p:nvPr/>
-        </p:nvCxnSpPr>
-        <p:spPr>
-          <a:xfrm>
-            <a:off x="7484594" y="2406821"/>
-            <a:ext cx="930349" cy="1196217"/>
-          </a:xfrm>
-          <a:prstGeom prst="straightConnector1">
-            <a:avLst/>
-          </a:prstGeom>
-          <a:ln w="38100">
-            <a:tailEnd type="triangle"/>
-          </a:ln>
-        </p:spPr>
-        <p:style>
-          <a:lnRef idx="1">
-            <a:schemeClr val="accent6"/>
-          </a:lnRef>
-          <a:fillRef idx="0">
-            <a:schemeClr val="accent6"/>
-          </a:fillRef>
-          <a:effectRef idx="0">
-            <a:schemeClr val="accent6"/>
-          </a:effectRef>
-          <a:fontRef idx="minor">
-            <a:schemeClr val="tx1"/>
-          </a:fontRef>
-        </p:style>
-      </p:cxnSp>
-      <p:cxnSp>
-        <p:nvCxnSpPr>
-          <p:cNvPr id="15" name="Gerade Verbindung mit Pfeil 14">
-            <a:extLst>
-              <a:ext uri="{FF2B5EF4-FFF2-40B4-BE49-F238E27FC236}">
-                <a16:creationId xmlns:a16="http://schemas.microsoft.com/office/drawing/2014/main" id="{D4E5C31C-9B9C-F341-EEA1-5D4D259F6AAC}"/>
-              </a:ext>
-            </a:extLst>
-          </p:cNvPr>
-          <p:cNvCxnSpPr>
-            <a:cxnSpLocks/>
-            <a:stCxn id="6" idx="3"/>
-            <a:endCxn id="7" idx="7"/>
-          </p:cNvCxnSpPr>
-          <p:nvPr/>
-        </p:nvCxnSpPr>
-        <p:spPr>
-          <a:xfrm flipH="1">
-            <a:off x="4265799" y="3936187"/>
-            <a:ext cx="1033133" cy="942966"/>
-          </a:xfrm>
-          <a:prstGeom prst="straightConnector1">
-            <a:avLst/>
-          </a:prstGeom>
-          <a:ln w="38100">
-            <a:tailEnd type="triangle"/>
-          </a:ln>
-        </p:spPr>
-        <p:style>
-          <a:lnRef idx="1">
-            <a:schemeClr val="accent6"/>
-          </a:lnRef>
-          <a:fillRef idx="0">
-            <a:schemeClr val="accent6"/>
-          </a:fillRef>
-          <a:effectRef idx="0">
-            <a:schemeClr val="accent6"/>
-          </a:effectRef>
-          <a:fontRef idx="minor">
-            <a:schemeClr val="tx1"/>
-          </a:fontRef>
-        </p:style>
-      </p:cxnSp>
-      <p:cxnSp>
-        <p:nvCxnSpPr>
-          <p:cNvPr id="22" name="Gerade Verbindung mit Pfeil 21">
-            <a:extLst>
-              <a:ext uri="{FF2B5EF4-FFF2-40B4-BE49-F238E27FC236}">
-                <a16:creationId xmlns:a16="http://schemas.microsoft.com/office/drawing/2014/main" id="{8CCC3F78-70DB-20E8-C281-A5BCE6478A0B}"/>
-              </a:ext>
-            </a:extLst>
-          </p:cNvPr>
-          <p:cNvCxnSpPr>
-            <a:cxnSpLocks/>
-            <a:stCxn id="6" idx="5"/>
-            <a:endCxn id="8" idx="1"/>
-          </p:cNvCxnSpPr>
-          <p:nvPr/>
-        </p:nvCxnSpPr>
-        <p:spPr>
-          <a:xfrm>
-            <a:off x="5805704" y="3936187"/>
-            <a:ext cx="973969" cy="942966"/>
-          </a:xfrm>
-          <a:prstGeom prst="straightConnector1">
-            <a:avLst/>
-          </a:prstGeom>
-          <a:ln w="38100">
-            <a:tailEnd type="triangle"/>
-          </a:ln>
-        </p:spPr>
-        <p:style>
-          <a:lnRef idx="1">
-            <a:schemeClr val="accent6"/>
-          </a:lnRef>
-          <a:fillRef idx="0">
-            <a:schemeClr val="accent6"/>
-          </a:fillRef>
-          <a:effectRef idx="0">
-            <a:schemeClr val="accent6"/>
-          </a:effectRef>
-          <a:fontRef idx="minor">
-            <a:schemeClr val="tx1"/>
-          </a:fontRef>
-        </p:style>
-      </p:cxnSp>
-      <p:sp>
-        <p:nvSpPr>
-          <p:cNvPr id="38" name="Textfeld 37">
-            <a:extLst>
-              <a:ext uri="{FF2B5EF4-FFF2-40B4-BE49-F238E27FC236}">
-                <a16:creationId xmlns:a16="http://schemas.microsoft.com/office/drawing/2014/main" id="{160B50BF-E8FE-60F5-E2C1-753A44DC864B}"/>
-              </a:ext>
-            </a:extLst>
-          </p:cNvPr>
-          <p:cNvSpPr txBox="1"/>
-          <p:nvPr/>
-        </p:nvSpPr>
-        <p:spPr>
-          <a:xfrm>
-            <a:off x="6872866" y="1534982"/>
-            <a:ext cx="809877" cy="369332"/>
-          </a:xfrm>
-          <a:prstGeom prst="rect">
-            <a:avLst/>
-          </a:prstGeom>
-          <a:noFill/>
-        </p:spPr>
-        <p:txBody>
-          <a:bodyPr wrap="square" rtlCol="0">
-            <a:spAutoFit/>
-          </a:bodyPr>
-          <a:lstStyle/>
-          <a:p>
-            <a:r>
-              <a:rPr lang="de-DE" dirty="0"/>
-              <a:t>Root</a:t>
-            </a:r>
-            <a:endParaRPr lang="es-ES" dirty="0"/>
-          </a:p>
-        </p:txBody>
-      </p:sp>
-      <p:sp>
-        <p:nvSpPr>
-          <p:cNvPr id="39" name="Textfeld 38">
-            <a:extLst>
-              <a:ext uri="{FF2B5EF4-FFF2-40B4-BE49-F238E27FC236}">
-                <a16:creationId xmlns:a16="http://schemas.microsoft.com/office/drawing/2014/main" id="{75018DEE-287E-F1A0-5F00-B1694BC631AC}"/>
-              </a:ext>
-            </a:extLst>
-          </p:cNvPr>
-          <p:cNvSpPr txBox="1"/>
-          <p:nvPr/>
-        </p:nvSpPr>
-        <p:spPr>
-          <a:xfrm>
-            <a:off x="7682743" y="1644073"/>
-            <a:ext cx="1516675" cy="923330"/>
-          </a:xfrm>
-          <a:prstGeom prst="rect">
-            <a:avLst/>
-          </a:prstGeom>
-          <a:noFill/>
-        </p:spPr>
-        <p:txBody>
-          <a:bodyPr wrap="square" rtlCol="0">
-            <a:spAutoFit/>
-          </a:bodyPr>
-          <a:lstStyle/>
-          <a:p>
-            <a:r>
-              <a:rPr lang="de-DE" dirty="0"/>
-              <a:t>w₀ = 0</a:t>
-            </a:r>
-          </a:p>
-          <a:p>
-            <a:r>
-              <a:rPr lang="de-DE" dirty="0"/>
-              <a:t>n₀ = 0</a:t>
-            </a:r>
-          </a:p>
-          <a:p>
-            <a:r>
-              <a:rPr lang="de-DE" dirty="0"/>
-              <a:t>P₀ = /</a:t>
-            </a:r>
-            <a:endParaRPr lang="es-ES" dirty="0"/>
-          </a:p>
-        </p:txBody>
-      </p:sp>
-    </p:spTree>
-    <p:extLst>
-      <p:ext uri="{BB962C8B-B14F-4D97-AF65-F5344CB8AC3E}">
-        <p14:creationId xmlns:p14="http://schemas.microsoft.com/office/powerpoint/2010/main" val="1608700028"/>
-      </p:ext>
-    </p:extLst>
-  </p:cSld>
-  <p:clrMapOvr>
-    <a:masterClrMapping/>
-  </p:clrMapOvr>
 </p:sld>
 </file>
 

</xml_diff>